<commit_message>
Rearranged the lab discussion
</commit_message>
<xml_diff>
--- a/units/unit00_course_intro/course_intro.pptx
+++ b/units/unit00_course_intro/course_intro.pptx
@@ -14281,7 +14281,14 @@
           <a:lstStyle/>
           <a:p>
             <a:r>
-              <a:rPr lang="en-US" dirty="0"/>
+              <a:rPr lang="en-US" dirty="0">
+                <a:solidFill>
+                  <a:schemeClr val="accent1">
+                    <a:lumMod val="60000"/>
+                    <a:lumOff val="40000"/>
+                  </a:schemeClr>
+                </a:solidFill>
+              </a:rPr>
               <a:t>Concurrency</a:t>
             </a:r>
           </a:p>
@@ -14308,7 +14315,14 @@
           </a:p>
           <a:p>
             <a:r>
-              <a:rPr lang="en-US" dirty="0"/>
+              <a:rPr lang="en-US" dirty="0">
+                <a:solidFill>
+                  <a:schemeClr val="accent1">
+                    <a:lumMod val="60000"/>
+                    <a:lumOff val="40000"/>
+                  </a:schemeClr>
+                </a:solidFill>
+              </a:rPr>
               <a:t>Long turnaround time</a:t>
             </a:r>
           </a:p>
@@ -14328,7 +14342,14 @@
           </a:p>
           <a:p>
             <a:r>
-              <a:rPr lang="en-US" dirty="0"/>
+              <a:rPr lang="en-US" dirty="0">
+                <a:solidFill>
+                  <a:schemeClr val="accent1">
+                    <a:lumMod val="60000"/>
+                    <a:lumOff val="40000"/>
+                  </a:schemeClr>
+                </a:solidFill>
+              </a:rPr>
               <a:t>Need for interface abstraction</a:t>
             </a:r>
           </a:p>

</xml_diff>